<commit_message>
Cleanup as part of PPT preparation
</commit_message>
<xml_diff>
--- a/presentations/ThePuzzle.pptx
+++ b/presentations/ThePuzzle.pptx
@@ -222,7 +222,7 @@
           <a:p>
             <a:fld id="{F92027FF-59D9-49BB-89B3-BDEC4C1BCB10}" type="datetimeFigureOut">
               <a:rPr lang="en-US" smtClean="0"/>
-              <a:t>9/24/2016</a:t>
+              <a:t>9/25/2016</a:t>
             </a:fld>
             <a:endParaRPr lang="en-US"/>
           </a:p>
@@ -2226,6 +2226,725 @@
 </p:notes>
 </file>
 
+<file path=ppt/notesSlides/notesSlide23.xml><?xml version="1.0" encoding="utf-8"?>
+<p:notes xmlns:a="http://schemas.openxmlformats.org/drawingml/2006/main" xmlns:r="http://schemas.openxmlformats.org/officeDocument/2006/relationships" xmlns:p="http://schemas.openxmlformats.org/presentationml/2006/main">
+  <p:cSld>
+    <p:spTree>
+      <p:nvGrpSpPr>
+        <p:cNvPr id="1" name=""/>
+        <p:cNvGrpSpPr/>
+        <p:nvPr/>
+      </p:nvGrpSpPr>
+      <p:grpSpPr>
+        <a:xfrm>
+          <a:off x="0" y="0"/>
+          <a:ext cx="0" cy="0"/>
+          <a:chOff x="0" y="0"/>
+          <a:chExt cx="0" cy="0"/>
+        </a:xfrm>
+      </p:grpSpPr>
+      <p:sp>
+        <p:nvSpPr>
+          <p:cNvPr id="2" name="Slide Image Placeholder 1"/>
+          <p:cNvSpPr>
+            <a:spLocks noGrp="1" noRot="1" noChangeAspect="1"/>
+          </p:cNvSpPr>
+          <p:nvPr>
+            <p:ph type="sldImg"/>
+          </p:nvPr>
+        </p:nvSpPr>
+        <p:spPr/>
+      </p:sp>
+      <p:sp>
+        <p:nvSpPr>
+          <p:cNvPr id="3" name="Notes Placeholder 2"/>
+          <p:cNvSpPr>
+            <a:spLocks noGrp="1"/>
+          </p:cNvSpPr>
+          <p:nvPr>
+            <p:ph type="body" idx="1"/>
+          </p:nvPr>
+        </p:nvSpPr>
+        <p:spPr/>
+        <p:txBody>
+          <a:bodyPr/>
+          <a:lstStyle/>
+          <a:p>
+            <a:r>
+              <a:rPr lang="en-US" dirty="0" smtClean="0"/>
+              <a:t>We started this study by looking at a couple of puzzle pieces that both spoke of the body of Christ. One verse was in Corinthians and the other was in Ephesians. In Ephesians we read:</a:t>
+            </a:r>
+            <a:endParaRPr lang="en-US" dirty="0"/>
+          </a:p>
+        </p:txBody>
+      </p:sp>
+      <p:sp>
+        <p:nvSpPr>
+          <p:cNvPr id="4" name="Slide Number Placeholder 3"/>
+          <p:cNvSpPr>
+            <a:spLocks noGrp="1"/>
+          </p:cNvSpPr>
+          <p:nvPr>
+            <p:ph type="sldNum" sz="quarter" idx="10"/>
+          </p:nvPr>
+        </p:nvSpPr>
+        <p:spPr/>
+        <p:txBody>
+          <a:bodyPr/>
+          <a:lstStyle/>
+          <a:p>
+            <a:fld id="{A7D6D802-EDA5-48B6-8B84-D91D004D85B4}" type="slidenum">
+              <a:rPr lang="en-US" smtClean="0"/>
+              <a:t>25</a:t>
+            </a:fld>
+            <a:endParaRPr lang="en-US"/>
+          </a:p>
+        </p:txBody>
+      </p:sp>
+    </p:spTree>
+    <p:extLst>
+      <p:ext uri="{BB962C8B-B14F-4D97-AF65-F5344CB8AC3E}">
+        <p14:creationId xmlns:p14="http://schemas.microsoft.com/office/powerpoint/2010/main" val="3225698418"/>
+      </p:ext>
+    </p:extLst>
+  </p:cSld>
+  <p:clrMapOvr>
+    <a:masterClrMapping/>
+  </p:clrMapOvr>
+</p:notes>
+</file>
+
+<file path=ppt/notesSlides/notesSlide24.xml><?xml version="1.0" encoding="utf-8"?>
+<p:notes xmlns:a="http://schemas.openxmlformats.org/drawingml/2006/main" xmlns:r="http://schemas.openxmlformats.org/officeDocument/2006/relationships" xmlns:p="http://schemas.openxmlformats.org/presentationml/2006/main">
+  <p:cSld>
+    <p:spTree>
+      <p:nvGrpSpPr>
+        <p:cNvPr id="1" name=""/>
+        <p:cNvGrpSpPr/>
+        <p:nvPr/>
+      </p:nvGrpSpPr>
+      <p:grpSpPr>
+        <a:xfrm>
+          <a:off x="0" y="0"/>
+          <a:ext cx="0" cy="0"/>
+          <a:chOff x="0" y="0"/>
+          <a:chExt cx="0" cy="0"/>
+        </a:xfrm>
+      </p:grpSpPr>
+      <p:sp>
+        <p:nvSpPr>
+          <p:cNvPr id="2" name="Slide Image Placeholder 1"/>
+          <p:cNvSpPr>
+            <a:spLocks noGrp="1" noRot="1" noChangeAspect="1"/>
+          </p:cNvSpPr>
+          <p:nvPr>
+            <p:ph type="sldImg"/>
+          </p:nvPr>
+        </p:nvSpPr>
+        <p:spPr/>
+      </p:sp>
+      <p:sp>
+        <p:nvSpPr>
+          <p:cNvPr id="3" name="Notes Placeholder 2"/>
+          <p:cNvSpPr>
+            <a:spLocks noGrp="1"/>
+          </p:cNvSpPr>
+          <p:nvPr>
+            <p:ph type="body" idx="1"/>
+          </p:nvPr>
+        </p:nvSpPr>
+        <p:spPr/>
+        <p:txBody>
+          <a:bodyPr/>
+          <a:lstStyle/>
+          <a:p>
+            <a:r>
+              <a:rPr lang="en-US" dirty="0" smtClean="0"/>
+              <a:t>Looking at other parts of the book of Ephesians (including the very next verse), we saw that the body Paul is speaking of here is the husband, with Christ as head. Ephesians does not speak about “brides” or “virgins”. The only place “wife” enters</a:t>
+            </a:r>
+            <a:r>
+              <a:rPr lang="en-US" baseline="0" dirty="0" smtClean="0"/>
+              <a:t> into it is when Paul is discussing our </a:t>
+            </a:r>
+            <a:r>
+              <a:rPr lang="en-US" baseline="0" dirty="0" err="1" smtClean="0"/>
+              <a:t>our</a:t>
+            </a:r>
+            <a:r>
+              <a:rPr lang="en-US" baseline="0" dirty="0" smtClean="0"/>
+              <a:t> down to earth, day to day relationships reflect what is going on in Christ. </a:t>
+            </a:r>
+            <a:r>
+              <a:rPr lang="en-US" dirty="0" smtClean="0"/>
+              <a:t>Paul never identifies believers in Ephesians as part of any body except for the body of Christ as husband.</a:t>
+            </a:r>
+          </a:p>
+          <a:p>
+            <a:endParaRPr lang="en-US" dirty="0" smtClean="0"/>
+          </a:p>
+          <a:p>
+            <a:r>
+              <a:rPr lang="en-US" dirty="0" smtClean="0"/>
+              <a:t>We also saw a verse in Corinthians that read like this:</a:t>
+            </a:r>
+            <a:endParaRPr lang="en-US" dirty="0"/>
+          </a:p>
+        </p:txBody>
+      </p:sp>
+      <p:sp>
+        <p:nvSpPr>
+          <p:cNvPr id="4" name="Slide Number Placeholder 3"/>
+          <p:cNvSpPr>
+            <a:spLocks noGrp="1"/>
+          </p:cNvSpPr>
+          <p:nvPr>
+            <p:ph type="sldNum" sz="quarter" idx="10"/>
+          </p:nvPr>
+        </p:nvSpPr>
+        <p:spPr/>
+        <p:txBody>
+          <a:bodyPr/>
+          <a:lstStyle/>
+          <a:p>
+            <a:fld id="{A7D6D802-EDA5-48B6-8B84-D91D004D85B4}" type="slidenum">
+              <a:rPr lang="en-US" smtClean="0"/>
+              <a:t>26</a:t>
+            </a:fld>
+            <a:endParaRPr lang="en-US"/>
+          </a:p>
+        </p:txBody>
+      </p:sp>
+    </p:spTree>
+    <p:extLst>
+      <p:ext uri="{BB962C8B-B14F-4D97-AF65-F5344CB8AC3E}">
+        <p14:creationId xmlns:p14="http://schemas.microsoft.com/office/powerpoint/2010/main" val="1474638902"/>
+      </p:ext>
+    </p:extLst>
+  </p:cSld>
+  <p:clrMapOvr>
+    <a:masterClrMapping/>
+  </p:clrMapOvr>
+</p:notes>
+</file>
+
+<file path=ppt/notesSlides/notesSlide25.xml><?xml version="1.0" encoding="utf-8"?>
+<p:notes xmlns:a="http://schemas.openxmlformats.org/drawingml/2006/main" xmlns:r="http://schemas.openxmlformats.org/officeDocument/2006/relationships" xmlns:p="http://schemas.openxmlformats.org/presentationml/2006/main">
+  <p:cSld>
+    <p:spTree>
+      <p:nvGrpSpPr>
+        <p:cNvPr id="1" name=""/>
+        <p:cNvGrpSpPr/>
+        <p:nvPr/>
+      </p:nvGrpSpPr>
+      <p:grpSpPr>
+        <a:xfrm>
+          <a:off x="0" y="0"/>
+          <a:ext cx="0" cy="0"/>
+          <a:chOff x="0" y="0"/>
+          <a:chExt cx="0" cy="0"/>
+        </a:xfrm>
+      </p:grpSpPr>
+      <p:sp>
+        <p:nvSpPr>
+          <p:cNvPr id="2" name="Slide Image Placeholder 1"/>
+          <p:cNvSpPr>
+            <a:spLocks noGrp="1" noRot="1" noChangeAspect="1"/>
+          </p:cNvSpPr>
+          <p:nvPr>
+            <p:ph type="sldImg"/>
+          </p:nvPr>
+        </p:nvSpPr>
+        <p:spPr/>
+      </p:sp>
+      <p:sp>
+        <p:nvSpPr>
+          <p:cNvPr id="3" name="Notes Placeholder 2"/>
+          <p:cNvSpPr>
+            <a:spLocks noGrp="1"/>
+          </p:cNvSpPr>
+          <p:nvPr>
+            <p:ph type="body" idx="1"/>
+          </p:nvPr>
+        </p:nvSpPr>
+        <p:spPr/>
+        <p:txBody>
+          <a:bodyPr/>
+          <a:lstStyle/>
+          <a:p>
+            <a:r>
+              <a:rPr lang="en-US" dirty="0" smtClean="0"/>
+              <a:t>Paul says to these very same believers in 2 Corinthians that they are </a:t>
+            </a:r>
+            <a:r>
+              <a:rPr lang="en-US" dirty="0" err="1" smtClean="0"/>
+              <a:t>betroweth</a:t>
+            </a:r>
+            <a:r>
+              <a:rPr lang="en-US" dirty="0" smtClean="0"/>
+              <a:t> to become the "Bride of Christ". So Paul says to the Ephesian believers "you're the body of Christ" and "you're forming the husband". And to the Corinthian believers he says "you're the body of </a:t>
+            </a:r>
+            <a:r>
+              <a:rPr lang="en-US" dirty="0" err="1" smtClean="0"/>
+              <a:t>Chirst</a:t>
+            </a:r>
+            <a:r>
+              <a:rPr lang="en-US" dirty="0" smtClean="0"/>
+              <a:t>" and "you're forming the Bride." The question is: how do we understand these statements together? Is there one body of Christ or are there two bodies of Christ? Or is the body of Christ just not quite as simple as me might have thought it to be.</a:t>
+            </a:r>
+          </a:p>
+          <a:p>
+            <a:endParaRPr lang="en-US" dirty="0" smtClean="0"/>
+          </a:p>
+          <a:p>
+            <a:r>
+              <a:rPr lang="en-US" dirty="0" smtClean="0"/>
+              <a:t>Right now, we're lacking a piece of this overall picture that can provide insight. Christ is referred to by Paul as the "Last Adam". In other words, the first man Adam back in Genesis foreshadows or symbolizes Christ, the Last Adam. While Adam is definitely not a perfect reflection of Christ, there are clear parallels between the purpose of God that unfolds through Adam and the ultimate purpose that is revealed through Christ. </a:t>
+            </a:r>
+          </a:p>
+          <a:p>
+            <a:endParaRPr lang="en-US" dirty="0" smtClean="0"/>
+          </a:p>
+          <a:p>
+            <a:r>
+              <a:rPr lang="en-US" dirty="0" smtClean="0"/>
+              <a:t>The creation of the first Adam is recorded in Genesis 2. Adam is created when God forms him from the dust of the ground and breaths into him the breath of life. Adam spends a period of time alone. Not much is said about this time. We don't know how long this lasted, but he was probably spending it taking care of the creation God had given to him and naming the various living creatures. But up to this point, he was alone so far as human companionship is concerned:</a:t>
+            </a:r>
+            <a:endParaRPr lang="en-US" dirty="0"/>
+          </a:p>
+        </p:txBody>
+      </p:sp>
+      <p:sp>
+        <p:nvSpPr>
+          <p:cNvPr id="4" name="Slide Number Placeholder 3"/>
+          <p:cNvSpPr>
+            <a:spLocks noGrp="1"/>
+          </p:cNvSpPr>
+          <p:nvPr>
+            <p:ph type="sldNum" sz="quarter" idx="10"/>
+          </p:nvPr>
+        </p:nvSpPr>
+        <p:spPr/>
+        <p:txBody>
+          <a:bodyPr/>
+          <a:lstStyle/>
+          <a:p>
+            <a:fld id="{A7D6D802-EDA5-48B6-8B84-D91D004D85B4}" type="slidenum">
+              <a:rPr lang="en-US" smtClean="0"/>
+              <a:t>27</a:t>
+            </a:fld>
+            <a:endParaRPr lang="en-US"/>
+          </a:p>
+        </p:txBody>
+      </p:sp>
+    </p:spTree>
+    <p:extLst>
+      <p:ext uri="{BB962C8B-B14F-4D97-AF65-F5344CB8AC3E}">
+        <p14:creationId xmlns:p14="http://schemas.microsoft.com/office/powerpoint/2010/main" val="2651688932"/>
+      </p:ext>
+    </p:extLst>
+  </p:cSld>
+  <p:clrMapOvr>
+    <a:masterClrMapping/>
+  </p:clrMapOvr>
+</p:notes>
+</file>
+
+<file path=ppt/notesSlides/notesSlide26.xml><?xml version="1.0" encoding="utf-8"?>
+<p:notes xmlns:a="http://schemas.openxmlformats.org/drawingml/2006/main" xmlns:r="http://schemas.openxmlformats.org/officeDocument/2006/relationships" xmlns:p="http://schemas.openxmlformats.org/presentationml/2006/main">
+  <p:cSld>
+    <p:spTree>
+      <p:nvGrpSpPr>
+        <p:cNvPr id="1" name=""/>
+        <p:cNvGrpSpPr/>
+        <p:nvPr/>
+      </p:nvGrpSpPr>
+      <p:grpSpPr>
+        <a:xfrm>
+          <a:off x="0" y="0"/>
+          <a:ext cx="0" cy="0"/>
+          <a:chOff x="0" y="0"/>
+          <a:chExt cx="0" cy="0"/>
+        </a:xfrm>
+      </p:grpSpPr>
+      <p:sp>
+        <p:nvSpPr>
+          <p:cNvPr id="2" name="Slide Image Placeholder 1"/>
+          <p:cNvSpPr>
+            <a:spLocks noGrp="1" noRot="1" noChangeAspect="1"/>
+          </p:cNvSpPr>
+          <p:nvPr>
+            <p:ph type="sldImg"/>
+          </p:nvPr>
+        </p:nvSpPr>
+        <p:spPr/>
+      </p:sp>
+      <p:sp>
+        <p:nvSpPr>
+          <p:cNvPr id="3" name="Notes Placeholder 2"/>
+          <p:cNvSpPr>
+            <a:spLocks noGrp="1"/>
+          </p:cNvSpPr>
+          <p:nvPr>
+            <p:ph type="body" idx="1"/>
+          </p:nvPr>
+        </p:nvSpPr>
+        <p:spPr/>
+        <p:txBody>
+          <a:bodyPr/>
+          <a:lstStyle/>
+          <a:p>
+            <a:r>
+              <a:rPr lang="en-US" dirty="0" smtClean="0"/>
+              <a:t>Why did God create Eve? So that Adam would have a helper. God knew that Adam needed a helper. How was Eve created?</a:t>
+            </a:r>
+            <a:endParaRPr lang="en-US" dirty="0"/>
+          </a:p>
+        </p:txBody>
+      </p:sp>
+      <p:sp>
+        <p:nvSpPr>
+          <p:cNvPr id="4" name="Slide Number Placeholder 3"/>
+          <p:cNvSpPr>
+            <a:spLocks noGrp="1"/>
+          </p:cNvSpPr>
+          <p:nvPr>
+            <p:ph type="sldNum" sz="quarter" idx="10"/>
+          </p:nvPr>
+        </p:nvSpPr>
+        <p:spPr/>
+        <p:txBody>
+          <a:bodyPr/>
+          <a:lstStyle/>
+          <a:p>
+            <a:fld id="{A7D6D802-EDA5-48B6-8B84-D91D004D85B4}" type="slidenum">
+              <a:rPr lang="en-US" smtClean="0"/>
+              <a:t>28</a:t>
+            </a:fld>
+            <a:endParaRPr lang="en-US"/>
+          </a:p>
+        </p:txBody>
+      </p:sp>
+    </p:spTree>
+    <p:extLst>
+      <p:ext uri="{BB962C8B-B14F-4D97-AF65-F5344CB8AC3E}">
+        <p14:creationId xmlns:p14="http://schemas.microsoft.com/office/powerpoint/2010/main" val="2630913627"/>
+      </p:ext>
+    </p:extLst>
+  </p:cSld>
+  <p:clrMapOvr>
+    <a:masterClrMapping/>
+  </p:clrMapOvr>
+</p:notes>
+</file>
+
+<file path=ppt/notesSlides/notesSlide27.xml><?xml version="1.0" encoding="utf-8"?>
+<p:notes xmlns:a="http://schemas.openxmlformats.org/drawingml/2006/main" xmlns:r="http://schemas.openxmlformats.org/officeDocument/2006/relationships" xmlns:p="http://schemas.openxmlformats.org/presentationml/2006/main">
+  <p:cSld>
+    <p:spTree>
+      <p:nvGrpSpPr>
+        <p:cNvPr id="1" name=""/>
+        <p:cNvGrpSpPr/>
+        <p:nvPr/>
+      </p:nvGrpSpPr>
+      <p:grpSpPr>
+        <a:xfrm>
+          <a:off x="0" y="0"/>
+          <a:ext cx="0" cy="0"/>
+          <a:chOff x="0" y="0"/>
+          <a:chExt cx="0" cy="0"/>
+        </a:xfrm>
+      </p:grpSpPr>
+      <p:sp>
+        <p:nvSpPr>
+          <p:cNvPr id="2" name="Slide Image Placeholder 1"/>
+          <p:cNvSpPr>
+            <a:spLocks noGrp="1" noRot="1" noChangeAspect="1"/>
+          </p:cNvSpPr>
+          <p:nvPr>
+            <p:ph type="sldImg"/>
+          </p:nvPr>
+        </p:nvSpPr>
+        <p:spPr/>
+      </p:sp>
+      <p:sp>
+        <p:nvSpPr>
+          <p:cNvPr id="3" name="Notes Placeholder 2"/>
+          <p:cNvSpPr>
+            <a:spLocks noGrp="1"/>
+          </p:cNvSpPr>
+          <p:nvPr>
+            <p:ph type="body" idx="1"/>
+          </p:nvPr>
+        </p:nvSpPr>
+        <p:spPr/>
+        <p:txBody>
+          <a:bodyPr/>
+          <a:lstStyle/>
+          <a:p>
+            <a:r>
+              <a:rPr lang="en-US" dirty="0" smtClean="0"/>
+              <a:t>So Eve was taken out from Adam, and the two of them together were the first human couple. Now for a question: were Adam and Eve one body or two bodies?. This isn't a trick question. If we consider this as literally as possible, the two of them started as one physical body. At first, there was only Adam. That's one body. But then, in God's time and according to God's purpose, Eve was formed from Adam. At this point, what started as one body became two bodies. God had a distinct and unique purpose for both man and woman.</a:t>
+            </a:r>
+            <a:r>
+              <a:rPr lang="en-US" baseline="0" dirty="0" smtClean="0"/>
+              <a:t> It was also part of God’s will that the two of them should be together. In other words, when He blessed them and told them to be fruitful, and multiply, and replenish the earth, it was only possible with both of them working together.</a:t>
+            </a:r>
+          </a:p>
+          <a:p>
+            <a:endParaRPr lang="en-US" baseline="0" dirty="0" smtClean="0"/>
+          </a:p>
+          <a:p>
+            <a:r>
+              <a:rPr lang="en-US" dirty="0" smtClean="0"/>
+              <a:t>Talk about Bride and Husband and how they are foreshadowed by Adam. Discuss the difference between Adam's line "bone of my bone" and what Paul says in </a:t>
+            </a:r>
+            <a:r>
+              <a:rPr lang="en-US" dirty="0" err="1" smtClean="0"/>
+              <a:t>Eph</a:t>
+            </a:r>
+            <a:r>
+              <a:rPr lang="en-US" dirty="0" smtClean="0"/>
+              <a:t> 5, members of His bones. Will Christ (or the Lamb in </a:t>
+            </a:r>
+            <a:r>
+              <a:rPr lang="en-US" dirty="0" err="1" smtClean="0"/>
+              <a:t>revelatoin</a:t>
+            </a:r>
+            <a:r>
+              <a:rPr lang="en-US" dirty="0" smtClean="0"/>
+              <a:t>) one day say to His bride, this is bone of my bone.</a:t>
+            </a:r>
+          </a:p>
+        </p:txBody>
+      </p:sp>
+      <p:sp>
+        <p:nvSpPr>
+          <p:cNvPr id="4" name="Slide Number Placeholder 3"/>
+          <p:cNvSpPr>
+            <a:spLocks noGrp="1"/>
+          </p:cNvSpPr>
+          <p:nvPr>
+            <p:ph type="sldNum" sz="quarter" idx="10"/>
+          </p:nvPr>
+        </p:nvSpPr>
+        <p:spPr/>
+        <p:txBody>
+          <a:bodyPr/>
+          <a:lstStyle/>
+          <a:p>
+            <a:fld id="{A7D6D802-EDA5-48B6-8B84-D91D004D85B4}" type="slidenum">
+              <a:rPr lang="en-US" smtClean="0"/>
+              <a:t>29</a:t>
+            </a:fld>
+            <a:endParaRPr lang="en-US"/>
+          </a:p>
+        </p:txBody>
+      </p:sp>
+    </p:spTree>
+    <p:extLst>
+      <p:ext uri="{BB962C8B-B14F-4D97-AF65-F5344CB8AC3E}">
+        <p14:creationId xmlns:p14="http://schemas.microsoft.com/office/powerpoint/2010/main" val="1161695409"/>
+      </p:ext>
+    </p:extLst>
+  </p:cSld>
+  <p:clrMapOvr>
+    <a:masterClrMapping/>
+  </p:clrMapOvr>
+</p:notes>
+</file>
+
+<file path=ppt/notesSlides/notesSlide28.xml><?xml version="1.0" encoding="utf-8"?>
+<p:notes xmlns:a="http://schemas.openxmlformats.org/drawingml/2006/main" xmlns:r="http://schemas.openxmlformats.org/officeDocument/2006/relationships" xmlns:p="http://schemas.openxmlformats.org/presentationml/2006/main">
+  <p:cSld>
+    <p:spTree>
+      <p:nvGrpSpPr>
+        <p:cNvPr id="1" name=""/>
+        <p:cNvGrpSpPr/>
+        <p:nvPr/>
+      </p:nvGrpSpPr>
+      <p:grpSpPr>
+        <a:xfrm>
+          <a:off x="0" y="0"/>
+          <a:ext cx="0" cy="0"/>
+          <a:chOff x="0" y="0"/>
+          <a:chExt cx="0" cy="0"/>
+        </a:xfrm>
+      </p:grpSpPr>
+      <p:sp>
+        <p:nvSpPr>
+          <p:cNvPr id="2" name="Slide Image Placeholder 1"/>
+          <p:cNvSpPr>
+            <a:spLocks noGrp="1" noRot="1" noChangeAspect="1"/>
+          </p:cNvSpPr>
+          <p:nvPr>
+            <p:ph type="sldImg"/>
+          </p:nvPr>
+        </p:nvSpPr>
+        <p:spPr/>
+      </p:sp>
+      <p:sp>
+        <p:nvSpPr>
+          <p:cNvPr id="3" name="Notes Placeholder 2"/>
+          <p:cNvSpPr>
+            <a:spLocks noGrp="1"/>
+          </p:cNvSpPr>
+          <p:nvPr>
+            <p:ph type="body" idx="1"/>
+          </p:nvPr>
+        </p:nvSpPr>
+        <p:spPr/>
+        <p:txBody>
+          <a:bodyPr/>
+          <a:lstStyle/>
+          <a:p>
+            <a:r>
+              <a:rPr lang="en-US" dirty="0" smtClean="0"/>
+              <a:t>This</a:t>
+            </a:r>
+            <a:r>
+              <a:rPr lang="en-US" baseline="0" dirty="0" smtClean="0"/>
+              <a:t> is Adam identifying the fact that Eve was taken of his own body. This is as close as Eve could possibly get to Adam without physically being a part of his body. They are two different bodies. Paul says something in Ephesians that is similar to this, but still different:</a:t>
+            </a:r>
+            <a:endParaRPr lang="en-US" dirty="0"/>
+          </a:p>
+        </p:txBody>
+      </p:sp>
+      <p:sp>
+        <p:nvSpPr>
+          <p:cNvPr id="4" name="Slide Number Placeholder 3"/>
+          <p:cNvSpPr>
+            <a:spLocks noGrp="1"/>
+          </p:cNvSpPr>
+          <p:nvPr>
+            <p:ph type="sldNum" sz="quarter" idx="10"/>
+          </p:nvPr>
+        </p:nvSpPr>
+        <p:spPr/>
+        <p:txBody>
+          <a:bodyPr/>
+          <a:lstStyle/>
+          <a:p>
+            <a:fld id="{A7D6D802-EDA5-48B6-8B84-D91D004D85B4}" type="slidenum">
+              <a:rPr lang="en-US" smtClean="0"/>
+              <a:t>30</a:t>
+            </a:fld>
+            <a:endParaRPr lang="en-US"/>
+          </a:p>
+        </p:txBody>
+      </p:sp>
+    </p:spTree>
+    <p:extLst>
+      <p:ext uri="{BB962C8B-B14F-4D97-AF65-F5344CB8AC3E}">
+        <p14:creationId xmlns:p14="http://schemas.microsoft.com/office/powerpoint/2010/main" val="207288964"/>
+      </p:ext>
+    </p:extLst>
+  </p:cSld>
+  <p:clrMapOvr>
+    <a:masterClrMapping/>
+  </p:clrMapOvr>
+</p:notes>
+</file>
+
+<file path=ppt/notesSlides/notesSlide29.xml><?xml version="1.0" encoding="utf-8"?>
+<p:notes xmlns:a="http://schemas.openxmlformats.org/drawingml/2006/main" xmlns:r="http://schemas.openxmlformats.org/officeDocument/2006/relationships" xmlns:p="http://schemas.openxmlformats.org/presentationml/2006/main">
+  <p:cSld>
+    <p:spTree>
+      <p:nvGrpSpPr>
+        <p:cNvPr id="1" name=""/>
+        <p:cNvGrpSpPr/>
+        <p:nvPr/>
+      </p:nvGrpSpPr>
+      <p:grpSpPr>
+        <a:xfrm>
+          <a:off x="0" y="0"/>
+          <a:ext cx="0" cy="0"/>
+          <a:chOff x="0" y="0"/>
+          <a:chExt cx="0" cy="0"/>
+        </a:xfrm>
+      </p:grpSpPr>
+      <p:sp>
+        <p:nvSpPr>
+          <p:cNvPr id="2" name="Slide Image Placeholder 1"/>
+          <p:cNvSpPr>
+            <a:spLocks noGrp="1" noRot="1" noChangeAspect="1"/>
+          </p:cNvSpPr>
+          <p:nvPr>
+            <p:ph type="sldImg"/>
+          </p:nvPr>
+        </p:nvSpPr>
+        <p:spPr/>
+      </p:sp>
+      <p:sp>
+        <p:nvSpPr>
+          <p:cNvPr id="3" name="Notes Placeholder 2"/>
+          <p:cNvSpPr>
+            <a:spLocks noGrp="1"/>
+          </p:cNvSpPr>
+          <p:nvPr>
+            <p:ph type="body" idx="1"/>
+          </p:nvPr>
+        </p:nvSpPr>
+        <p:spPr/>
+        <p:txBody>
+          <a:bodyPr/>
+          <a:lstStyle/>
+          <a:p>
+            <a:r>
+              <a:rPr lang="en-US" dirty="0" smtClean="0"/>
+              <a:t>Instead of Paul saying that we</a:t>
+            </a:r>
+            <a:r>
+              <a:rPr lang="en-US" baseline="0" dirty="0" smtClean="0"/>
+              <a:t> were taken out of the Body of Christ and that we are like </a:t>
+            </a:r>
+            <a:r>
+              <a:rPr lang="en-US" baseline="0" dirty="0" err="1" smtClean="0"/>
+              <a:t>Chrirst</a:t>
+            </a:r>
+            <a:r>
+              <a:rPr lang="en-US" baseline="0" dirty="0" smtClean="0"/>
+              <a:t>, he says here that we are directly a part of His body. Instead of “bone of His bone” and “flesh of His flesh” we are members of His flesh and His </a:t>
+            </a:r>
+            <a:endParaRPr lang="en-US" dirty="0"/>
+          </a:p>
+        </p:txBody>
+      </p:sp>
+      <p:sp>
+        <p:nvSpPr>
+          <p:cNvPr id="4" name="Slide Number Placeholder 3"/>
+          <p:cNvSpPr>
+            <a:spLocks noGrp="1"/>
+          </p:cNvSpPr>
+          <p:nvPr>
+            <p:ph type="sldNum" sz="quarter" idx="10"/>
+          </p:nvPr>
+        </p:nvSpPr>
+        <p:spPr/>
+        <p:txBody>
+          <a:bodyPr/>
+          <a:lstStyle/>
+          <a:p>
+            <a:fld id="{A7D6D802-EDA5-48B6-8B84-D91D004D85B4}" type="slidenum">
+              <a:rPr lang="en-US" smtClean="0"/>
+              <a:t>31</a:t>
+            </a:fld>
+            <a:endParaRPr lang="en-US"/>
+          </a:p>
+        </p:txBody>
+      </p:sp>
+    </p:spTree>
+    <p:extLst>
+      <p:ext uri="{BB962C8B-B14F-4D97-AF65-F5344CB8AC3E}">
+        <p14:creationId xmlns:p14="http://schemas.microsoft.com/office/powerpoint/2010/main" val="1589467344"/>
+      </p:ext>
+    </p:extLst>
+  </p:cSld>
+  <p:clrMapOvr>
+    <a:masterClrMapping/>
+  </p:clrMapOvr>
+</p:notes>
+</file>
+
 <file path=ppt/notesSlides/notesSlide3.xml><?xml version="1.0" encoding="utf-8"?>
 <p:notes xmlns:a="http://schemas.openxmlformats.org/drawingml/2006/main" xmlns:r="http://schemas.openxmlformats.org/officeDocument/2006/relationships" xmlns:p="http://schemas.openxmlformats.org/presentationml/2006/main">
   <p:cSld>
@@ -3174,7 +3893,7 @@
           <a:p>
             <a:fld id="{FFFCDF14-E4F4-45FC-95FE-37F39A039E15}" type="datetimeFigureOut">
               <a:rPr lang="en-US" smtClean="0"/>
-              <a:t>9/24/2016</a:t>
+              <a:t>9/25/2016</a:t>
             </a:fld>
             <a:endParaRPr lang="en-US"/>
           </a:p>
@@ -3344,7 +4063,7 @@
           <a:p>
             <a:fld id="{FFFCDF14-E4F4-45FC-95FE-37F39A039E15}" type="datetimeFigureOut">
               <a:rPr lang="en-US" smtClean="0"/>
-              <a:t>9/24/2016</a:t>
+              <a:t>9/25/2016</a:t>
             </a:fld>
             <a:endParaRPr lang="en-US"/>
           </a:p>
@@ -3524,7 +4243,7 @@
           <a:p>
             <a:fld id="{FFFCDF14-E4F4-45FC-95FE-37F39A039E15}" type="datetimeFigureOut">
               <a:rPr lang="en-US" smtClean="0"/>
-              <a:t>9/24/2016</a:t>
+              <a:t>9/25/2016</a:t>
             </a:fld>
             <a:endParaRPr lang="en-US"/>
           </a:p>
@@ -3694,7 +4413,7 @@
           <a:p>
             <a:fld id="{FFFCDF14-E4F4-45FC-95FE-37F39A039E15}" type="datetimeFigureOut">
               <a:rPr lang="en-US" smtClean="0"/>
-              <a:t>9/24/2016</a:t>
+              <a:t>9/25/2016</a:t>
             </a:fld>
             <a:endParaRPr lang="en-US"/>
           </a:p>
@@ -3940,7 +4659,7 @@
           <a:p>
             <a:fld id="{FFFCDF14-E4F4-45FC-95FE-37F39A039E15}" type="datetimeFigureOut">
               <a:rPr lang="en-US" smtClean="0"/>
-              <a:t>9/24/2016</a:t>
+              <a:t>9/25/2016</a:t>
             </a:fld>
             <a:endParaRPr lang="en-US"/>
           </a:p>
@@ -4228,7 +4947,7 @@
           <a:p>
             <a:fld id="{FFFCDF14-E4F4-45FC-95FE-37F39A039E15}" type="datetimeFigureOut">
               <a:rPr lang="en-US" smtClean="0"/>
-              <a:t>9/24/2016</a:t>
+              <a:t>9/25/2016</a:t>
             </a:fld>
             <a:endParaRPr lang="en-US"/>
           </a:p>
@@ -4650,7 +5369,7 @@
           <a:p>
             <a:fld id="{FFFCDF14-E4F4-45FC-95FE-37F39A039E15}" type="datetimeFigureOut">
               <a:rPr lang="en-US" smtClean="0"/>
-              <a:t>9/24/2016</a:t>
+              <a:t>9/25/2016</a:t>
             </a:fld>
             <a:endParaRPr lang="en-US"/>
           </a:p>
@@ -4768,7 +5487,7 @@
           <a:p>
             <a:fld id="{FFFCDF14-E4F4-45FC-95FE-37F39A039E15}" type="datetimeFigureOut">
               <a:rPr lang="en-US" smtClean="0"/>
-              <a:t>9/24/2016</a:t>
+              <a:t>9/25/2016</a:t>
             </a:fld>
             <a:endParaRPr lang="en-US"/>
           </a:p>
@@ -4863,7 +5582,7 @@
           <a:p>
             <a:fld id="{FFFCDF14-E4F4-45FC-95FE-37F39A039E15}" type="datetimeFigureOut">
               <a:rPr lang="en-US" smtClean="0"/>
-              <a:t>9/24/2016</a:t>
+              <a:t>9/25/2016</a:t>
             </a:fld>
             <a:endParaRPr lang="en-US"/>
           </a:p>
@@ -5140,7 +5859,7 @@
           <a:p>
             <a:fld id="{FFFCDF14-E4F4-45FC-95FE-37F39A039E15}" type="datetimeFigureOut">
               <a:rPr lang="en-US" smtClean="0"/>
-              <a:t>9/24/2016</a:t>
+              <a:t>9/25/2016</a:t>
             </a:fld>
             <a:endParaRPr lang="en-US"/>
           </a:p>
@@ -5393,7 +6112,7 @@
           <a:p>
             <a:fld id="{FFFCDF14-E4F4-45FC-95FE-37F39A039E15}" type="datetimeFigureOut">
               <a:rPr lang="en-US" smtClean="0"/>
-              <a:t>9/24/2016</a:t>
+              <a:t>9/25/2016</a:t>
             </a:fld>
             <a:endParaRPr lang="en-US"/>
           </a:p>
@@ -5606,7 +6325,7 @@
           <a:p>
             <a:fld id="{FFFCDF14-E4F4-45FC-95FE-37F39A039E15}" type="datetimeFigureOut">
               <a:rPr lang="en-US" smtClean="0"/>
-              <a:t>9/24/2016</a:t>
+              <a:t>9/25/2016</a:t>
             </a:fld>
             <a:endParaRPr lang="en-US"/>
           </a:p>
@@ -5998,7 +6717,7 @@
           <a:p>
             <a:r>
               <a:rPr lang="en-US" dirty="0" smtClean="0"/>
-              <a:t>The Puzzle</a:t>
+              <a:t>The Body of Christ</a:t>
             </a:r>
             <a:endParaRPr lang="en-US" dirty="0"/>
           </a:p>
@@ -6019,7 +6738,11 @@
           <a:bodyPr/>
           <a:lstStyle/>
           <a:p>
-            <a:endParaRPr lang="en-US"/>
+            <a:r>
+              <a:rPr lang="en-US" dirty="0" smtClean="0"/>
+              <a:t>Some Puzzle Pieces</a:t>
+            </a:r>
+            <a:endParaRPr lang="en-US" dirty="0"/>
           </a:p>
         </p:txBody>
       </p:sp>
@@ -7643,7 +8366,15 @@
             </a:pPr>
             <a:r>
               <a:rPr lang="en-US" dirty="0" smtClean="0"/>
-              <a:t>And He Himself gave some [to be] apostles, some prophets, some evangelists, and some pastors and teachers, for the equipping of the saints for the work of ministry, for the edifying of the body of Christ,</a:t>
+              <a:t>And He Himself gave some [to be] apostles, some prophets, some evangelists, and some pastors and teachers, for the equipping of the saints for the work of ministry, for the edifying of the </a:t>
+            </a:r>
+            <a:r>
+              <a:rPr lang="en-US" b="1" dirty="0" smtClean="0"/>
+              <a:t>body of Christ</a:t>
+            </a:r>
+            <a:r>
+              <a:rPr lang="en-US" dirty="0" smtClean="0"/>
+              <a:t>,</a:t>
             </a:r>
           </a:p>
           <a:p>
@@ -7732,7 +8463,15 @@
             </a:pPr>
             <a:r>
               <a:rPr lang="en-US" dirty="0" smtClean="0"/>
-              <a:t>Now you are the body of Christ, and members individually.</a:t>
+              <a:t>Now you are the </a:t>
+            </a:r>
+            <a:r>
+              <a:rPr lang="en-US" b="1" dirty="0" smtClean="0"/>
+              <a:t>body of Christ</a:t>
+            </a:r>
+            <a:r>
+              <a:rPr lang="en-US" dirty="0" smtClean="0"/>
+              <a:t>, and members individually.</a:t>
             </a:r>
             <a:endParaRPr lang="en-US" dirty="0"/>
           </a:p>
@@ -8144,7 +8883,15 @@
             </a:pPr>
             <a:r>
               <a:rPr lang="en-US" dirty="0" smtClean="0"/>
-              <a:t>For no one ever hated his own flesh, but nourishes and cherishes it, just as the Lord [does] the church. For we are members of His body, of His flesh and of His bones.</a:t>
+              <a:t>For no one ever hated his own flesh, but nourishes and cherishes it, just as the Lord [does] the church. For we are </a:t>
+            </a:r>
+            <a:r>
+              <a:rPr lang="en-US" b="1" dirty="0" smtClean="0"/>
+              <a:t>members of His body, of His flesh and of His bones</a:t>
+            </a:r>
+            <a:r>
+              <a:rPr lang="en-US" dirty="0" smtClean="0"/>
+              <a:t>.</a:t>
             </a:r>
             <a:endParaRPr lang="en-US" dirty="0"/>
           </a:p>

</xml_diff>